<commit_message>
Additional tweaking to presentations.
</commit_message>
<xml_diff>
--- a/Presentations/DIP.pptx
+++ b/Presentations/DIP.pptx
@@ -5,7 +5,7 @@
     <p:sldMasterId id="2147483648" r:id="rId1"/>
   </p:sldMasterIdLst>
   <p:notesMasterIdLst>
-    <p:notesMasterId r:id="rId19"/>
+    <p:notesMasterId r:id="rId20"/>
   </p:notesMasterIdLst>
   <p:sldIdLst>
     <p:sldId id="256" r:id="rId2"/>
@@ -22,9 +22,10 @@
     <p:sldId id="266" r:id="rId13"/>
     <p:sldId id="272" r:id="rId14"/>
     <p:sldId id="276" r:id="rId15"/>
-    <p:sldId id="282" r:id="rId16"/>
-    <p:sldId id="283" r:id="rId17"/>
-    <p:sldId id="284" r:id="rId18"/>
+    <p:sldId id="285" r:id="rId16"/>
+    <p:sldId id="282" r:id="rId17"/>
+    <p:sldId id="283" r:id="rId18"/>
+    <p:sldId id="284" r:id="rId19"/>
   </p:sldIdLst>
   <p:sldSz cx="12192000" cy="6858000"/>
   <p:notesSz cx="6858000" cy="9144000"/>
@@ -213,7 +214,7 @@
           <a:p>
             <a:fld id="{D7D9A16F-D302-4F6C-88DE-469A6962F06E}" type="datetimeFigureOut">
               <a:rPr lang="en-US" smtClean="0"/>
-              <a:t>12/11/2014</a:t>
+              <a:t>1/5/2015</a:t>
             </a:fld>
             <a:endParaRPr lang="en-US"/>
           </a:p>
@@ -1095,7 +1096,7 @@
     </p:spTree>
     <p:extLst>
       <p:ext uri="{BB962C8B-B14F-4D97-AF65-F5344CB8AC3E}">
-        <p14:creationId xmlns:p14="http://schemas.microsoft.com/office/powerpoint/2010/main" val="2709421392"/>
+        <p14:creationId xmlns:p14="http://schemas.microsoft.com/office/powerpoint/2010/main" val="1758163148"/>
       </p:ext>
     </p:extLst>
   </p:cSld>
@@ -1189,7 +1190,7 @@
     </p:spTree>
     <p:extLst>
       <p:ext uri="{BB962C8B-B14F-4D97-AF65-F5344CB8AC3E}">
-        <p14:creationId xmlns:p14="http://schemas.microsoft.com/office/powerpoint/2010/main" val="2219397391"/>
+        <p14:creationId xmlns:p14="http://schemas.microsoft.com/office/powerpoint/2010/main" val="2709421392"/>
       </p:ext>
     </p:extLst>
   </p:cSld>
@@ -1275,6 +1276,100 @@
             <a:fld id="{5E646BB7-50E9-43CE-B8D8-A01580F287EB}" type="slidenum">
               <a:rPr lang="en-US" smtClean="0"/>
               <a:t>17</a:t>
+            </a:fld>
+            <a:endParaRPr lang="en-US"/>
+          </a:p>
+        </p:txBody>
+      </p:sp>
+    </p:spTree>
+    <p:extLst>
+      <p:ext uri="{BB962C8B-B14F-4D97-AF65-F5344CB8AC3E}">
+        <p14:creationId xmlns:p14="http://schemas.microsoft.com/office/powerpoint/2010/main" val="2219397391"/>
+      </p:ext>
+    </p:extLst>
+  </p:cSld>
+  <p:clrMapOvr>
+    <a:masterClrMapping/>
+  </p:clrMapOvr>
+</p:notes>
+</file>
+
+<file path=ppt/notesSlides/notesSlide17.xml><?xml version="1.0" encoding="utf-8"?>
+<p:notes xmlns:a="http://schemas.openxmlformats.org/drawingml/2006/main" xmlns:r="http://schemas.openxmlformats.org/officeDocument/2006/relationships" xmlns:p="http://schemas.openxmlformats.org/presentationml/2006/main">
+  <p:cSld>
+    <p:spTree>
+      <p:nvGrpSpPr>
+        <p:cNvPr id="1" name=""/>
+        <p:cNvGrpSpPr/>
+        <p:nvPr/>
+      </p:nvGrpSpPr>
+      <p:grpSpPr>
+        <a:xfrm>
+          <a:off x="0" y="0"/>
+          <a:ext cx="0" cy="0"/>
+          <a:chOff x="0" y="0"/>
+          <a:chExt cx="0" cy="0"/>
+        </a:xfrm>
+      </p:grpSpPr>
+      <p:sp>
+        <p:nvSpPr>
+          <p:cNvPr id="2" name="Slide Image Placeholder 1"/>
+          <p:cNvSpPr>
+            <a:spLocks noGrp="1" noRot="1" noChangeAspect="1"/>
+          </p:cNvSpPr>
+          <p:nvPr>
+            <p:ph type="sldImg"/>
+          </p:nvPr>
+        </p:nvSpPr>
+        <p:spPr/>
+      </p:sp>
+      <p:sp>
+        <p:nvSpPr>
+          <p:cNvPr id="3" name="Notes Placeholder 2"/>
+          <p:cNvSpPr>
+            <a:spLocks noGrp="1"/>
+          </p:cNvSpPr>
+          <p:nvPr>
+            <p:ph type="body" idx="1"/>
+          </p:nvPr>
+        </p:nvSpPr>
+        <p:spPr/>
+        <p:txBody>
+          <a:bodyPr/>
+          <a:lstStyle/>
+          <a:p>
+            <a:r>
+              <a:rPr lang="en-US" dirty="0" smtClean="0"/>
+              <a:t>So we</a:t>
+            </a:r>
+            <a:r>
+              <a:rPr lang="en-US" baseline="0" dirty="0" smtClean="0"/>
+              <a:t> have done some of the work for you on this one. </a:t>
+            </a:r>
+          </a:p>
+          <a:p>
+            <a:endParaRPr lang="en-US" dirty="0"/>
+          </a:p>
+        </p:txBody>
+      </p:sp>
+      <p:sp>
+        <p:nvSpPr>
+          <p:cNvPr id="4" name="Slide Number Placeholder 3"/>
+          <p:cNvSpPr>
+            <a:spLocks noGrp="1"/>
+          </p:cNvSpPr>
+          <p:nvPr>
+            <p:ph type="sldNum" sz="quarter" idx="10"/>
+          </p:nvPr>
+        </p:nvSpPr>
+        <p:spPr/>
+        <p:txBody>
+          <a:bodyPr/>
+          <a:lstStyle/>
+          <a:p>
+            <a:fld id="{5E646BB7-50E9-43CE-B8D8-A01580F287EB}" type="slidenum">
+              <a:rPr lang="en-US" smtClean="0"/>
+              <a:t>18</a:t>
             </a:fld>
             <a:endParaRPr lang="en-US"/>
           </a:p>
@@ -1547,19 +1642,7 @@
             </a:r>
             <a:r>
               <a:rPr lang="en-US" baseline="0" dirty="0" smtClean="0"/>
-              <a:t> High level </a:t>
-            </a:r>
-            <a:r>
-              <a:rPr lang="en-US" baseline="0" dirty="0" smtClean="0"/>
-              <a:t>components </a:t>
-            </a:r>
-            <a:r>
-              <a:rPr lang="en-US" baseline="0" dirty="0" smtClean="0"/>
-              <a:t>often have a chain of low level dependencies which can have dependencies of their own</a:t>
-            </a:r>
-            <a:r>
-              <a:rPr lang="en-US" baseline="0" dirty="0" smtClean="0"/>
-              <a:t>.</a:t>
+              <a:t> High level components often have a chain of low level dependencies which can have dependencies of their own.</a:t>
             </a:r>
           </a:p>
           <a:p>
@@ -2271,7 +2354,7 @@
           <a:p>
             <a:fld id="{ABF9AFE4-9910-4F36-8626-ABF2E797B655}" type="datetimeFigureOut">
               <a:rPr lang="en-US" smtClean="0"/>
-              <a:t>12/11/2014</a:t>
+              <a:t>1/5/2015</a:t>
             </a:fld>
             <a:endParaRPr lang="en-US"/>
           </a:p>
@@ -2441,7 +2524,7 @@
           <a:p>
             <a:fld id="{ABF9AFE4-9910-4F36-8626-ABF2E797B655}" type="datetimeFigureOut">
               <a:rPr lang="en-US" smtClean="0"/>
-              <a:t>12/11/2014</a:t>
+              <a:t>1/5/2015</a:t>
             </a:fld>
             <a:endParaRPr lang="en-US"/>
           </a:p>
@@ -2621,7 +2704,7 @@
           <a:p>
             <a:fld id="{ABF9AFE4-9910-4F36-8626-ABF2E797B655}" type="datetimeFigureOut">
               <a:rPr lang="en-US" smtClean="0"/>
-              <a:t>12/11/2014</a:t>
+              <a:t>1/5/2015</a:t>
             </a:fld>
             <a:endParaRPr lang="en-US"/>
           </a:p>
@@ -2791,7 +2874,7 @@
           <a:p>
             <a:fld id="{ABF9AFE4-9910-4F36-8626-ABF2E797B655}" type="datetimeFigureOut">
               <a:rPr lang="en-US" smtClean="0"/>
-              <a:t>12/11/2014</a:t>
+              <a:t>1/5/2015</a:t>
             </a:fld>
             <a:endParaRPr lang="en-US"/>
           </a:p>
@@ -3037,7 +3120,7 @@
           <a:p>
             <a:fld id="{ABF9AFE4-9910-4F36-8626-ABF2E797B655}" type="datetimeFigureOut">
               <a:rPr lang="en-US" smtClean="0"/>
-              <a:t>12/11/2014</a:t>
+              <a:t>1/5/2015</a:t>
             </a:fld>
             <a:endParaRPr lang="en-US"/>
           </a:p>
@@ -3269,7 +3352,7 @@
           <a:p>
             <a:fld id="{ABF9AFE4-9910-4F36-8626-ABF2E797B655}" type="datetimeFigureOut">
               <a:rPr lang="en-US" smtClean="0"/>
-              <a:t>12/11/2014</a:t>
+              <a:t>1/5/2015</a:t>
             </a:fld>
             <a:endParaRPr lang="en-US"/>
           </a:p>
@@ -3636,7 +3719,7 @@
           <a:p>
             <a:fld id="{ABF9AFE4-9910-4F36-8626-ABF2E797B655}" type="datetimeFigureOut">
               <a:rPr lang="en-US" smtClean="0"/>
-              <a:t>12/11/2014</a:t>
+              <a:t>1/5/2015</a:t>
             </a:fld>
             <a:endParaRPr lang="en-US"/>
           </a:p>
@@ -3754,7 +3837,7 @@
           <a:p>
             <a:fld id="{ABF9AFE4-9910-4F36-8626-ABF2E797B655}" type="datetimeFigureOut">
               <a:rPr lang="en-US" smtClean="0"/>
-              <a:t>12/11/2014</a:t>
+              <a:t>1/5/2015</a:t>
             </a:fld>
             <a:endParaRPr lang="en-US"/>
           </a:p>
@@ -3849,7 +3932,7 @@
           <a:p>
             <a:fld id="{ABF9AFE4-9910-4F36-8626-ABF2E797B655}" type="datetimeFigureOut">
               <a:rPr lang="en-US" smtClean="0"/>
-              <a:t>12/11/2014</a:t>
+              <a:t>1/5/2015</a:t>
             </a:fld>
             <a:endParaRPr lang="en-US"/>
           </a:p>
@@ -4126,7 +4209,7 @@
           <a:p>
             <a:fld id="{ABF9AFE4-9910-4F36-8626-ABF2E797B655}" type="datetimeFigureOut">
               <a:rPr lang="en-US" smtClean="0"/>
-              <a:t>12/11/2014</a:t>
+              <a:t>1/5/2015</a:t>
             </a:fld>
             <a:endParaRPr lang="en-US"/>
           </a:p>
@@ -4379,7 +4462,7 @@
           <a:p>
             <a:fld id="{ABF9AFE4-9910-4F36-8626-ABF2E797B655}" type="datetimeFigureOut">
               <a:rPr lang="en-US" smtClean="0"/>
-              <a:t>12/11/2014</a:t>
+              <a:t>1/5/2015</a:t>
             </a:fld>
             <a:endParaRPr lang="en-US"/>
           </a:p>
@@ -4592,7 +4675,7 @@
           <a:p>
             <a:fld id="{ABF9AFE4-9910-4F36-8626-ABF2E797B655}" type="datetimeFigureOut">
               <a:rPr lang="en-US" smtClean="0"/>
-              <a:t>12/11/2014</a:t>
+              <a:t>1/5/2015</a:t>
             </a:fld>
             <a:endParaRPr lang="en-US"/>
           </a:p>
@@ -6022,6 +6105,87 @@
           <a:chExt cx="0" cy="0"/>
         </a:xfrm>
       </p:grpSpPr>
+      <p:sp>
+        <p:nvSpPr>
+          <p:cNvPr id="2" name="TextBox 1"/>
+          <p:cNvSpPr txBox="1"/>
+          <p:nvPr/>
+        </p:nvSpPr>
+        <p:spPr>
+          <a:xfrm>
+            <a:off x="1537853" y="2400300"/>
+            <a:ext cx="7387937" cy="1015663"/>
+          </a:xfrm>
+          <a:prstGeom prst="rect">
+            <a:avLst/>
+          </a:prstGeom>
+          <a:noFill/>
+        </p:spPr>
+        <p:txBody>
+          <a:bodyPr wrap="square" rtlCol="0">
+            <a:spAutoFit/>
+          </a:bodyPr>
+          <a:lstStyle/>
+          <a:p>
+            <a:r>
+              <a:rPr lang="en-US" sz="6000" dirty="0" smtClean="0"/>
+              <a:t>Mars Rover Exercise</a:t>
+            </a:r>
+            <a:endParaRPr lang="en-US" sz="6000" dirty="0"/>
+          </a:p>
+        </p:txBody>
+      </p:sp>
+    </p:spTree>
+    <p:extLst>
+      <p:ext uri="{BB962C8B-B14F-4D97-AF65-F5344CB8AC3E}">
+        <p14:creationId xmlns:p14="http://schemas.microsoft.com/office/powerpoint/2010/main" val="2802279598"/>
+      </p:ext>
+    </p:extLst>
+  </p:cSld>
+  <p:clrMapOvr>
+    <a:masterClrMapping/>
+  </p:clrMapOvr>
+  <p:timing>
+    <p:tnLst>
+      <p:par>
+        <p:cTn id="1" dur="indefinite" restart="never" nodeType="tmRoot"/>
+      </p:par>
+    </p:tnLst>
+  </p:timing>
+</p:sld>
+</file>
+
+<file path=ppt/slides/slide15.xml><?xml version="1.0" encoding="utf-8"?>
+<p:sld xmlns:a="http://schemas.openxmlformats.org/drawingml/2006/main" xmlns:r="http://schemas.openxmlformats.org/officeDocument/2006/relationships" xmlns:p="http://schemas.openxmlformats.org/presentationml/2006/main">
+  <p:cSld>
+    <p:bg>
+      <p:bgPr>
+        <a:blipFill dpi="0" rotWithShape="1">
+          <a:blip r:embed="rId3">
+            <a:lum/>
+          </a:blip>
+          <a:srcRect/>
+          <a:stretch>
+            <a:fillRect l="-2000" t="-17000" r="-2000" b="-17000"/>
+          </a:stretch>
+        </a:blipFill>
+        <a:effectLst/>
+      </p:bgPr>
+    </p:bg>
+    <p:spTree>
+      <p:nvGrpSpPr>
+        <p:cNvPr id="1" name=""/>
+        <p:cNvGrpSpPr/>
+        <p:nvPr/>
+      </p:nvGrpSpPr>
+      <p:grpSpPr>
+        <a:xfrm>
+          <a:off x="0" y="0"/>
+          <a:ext cx="0" cy="0"/>
+          <a:chOff x="0" y="0"/>
+          <a:chExt cx="0" cy="0"/>
+        </a:xfrm>
+      </p:grpSpPr>
       <p:pic>
         <p:nvPicPr>
           <p:cNvPr id="3" name="Picture 2"/>
@@ -6055,7 +6219,7 @@
     </p:spTree>
     <p:extLst>
       <p:ext uri="{BB962C8B-B14F-4D97-AF65-F5344CB8AC3E}">
-        <p14:creationId xmlns:p14="http://schemas.microsoft.com/office/powerpoint/2010/main" val="2802279598"/>
+        <p14:creationId xmlns:p14="http://schemas.microsoft.com/office/powerpoint/2010/main" val="2026925599"/>
       </p:ext>
     </p:extLst>
   </p:cSld>
@@ -6072,7 +6236,7 @@
 </p:sld>
 </file>
 
-<file path=ppt/slides/slide15.xml><?xml version="1.0" encoding="utf-8"?>
+<file path=ppt/slides/slide16.xml><?xml version="1.0" encoding="utf-8"?>
 <p:sld xmlns:a="http://schemas.openxmlformats.org/drawingml/2006/main" xmlns:r="http://schemas.openxmlformats.org/officeDocument/2006/relationships" xmlns:p="http://schemas.openxmlformats.org/presentationml/2006/main">
   <p:cSld>
     <p:bg>
@@ -6183,7 +6347,7 @@
 </p:sld>
 </file>
 
-<file path=ppt/slides/slide16.xml><?xml version="1.0" encoding="utf-8"?>
+<file path=ppt/slides/slide17.xml><?xml version="1.0" encoding="utf-8"?>
 <p:sld xmlns:a="http://schemas.openxmlformats.org/drawingml/2006/main" xmlns:r="http://schemas.openxmlformats.org/officeDocument/2006/relationships" xmlns:p="http://schemas.openxmlformats.org/presentationml/2006/main">
   <p:cSld>
     <p:bg>
@@ -6324,7 +6488,7 @@
 </p:sld>
 </file>
 
-<file path=ppt/slides/slide17.xml><?xml version="1.0" encoding="utf-8"?>
+<file path=ppt/slides/slide18.xml><?xml version="1.0" encoding="utf-8"?>
 <p:sld xmlns:a="http://schemas.openxmlformats.org/drawingml/2006/main" xmlns:r="http://schemas.openxmlformats.org/officeDocument/2006/relationships" xmlns:p="http://schemas.openxmlformats.org/presentationml/2006/main">
   <p:cSld>
     <p:bg>
@@ -6469,11 +6633,7 @@
           <a:p>
             <a:r>
               <a:rPr lang="en-US" sz="2400" dirty="0" smtClean="0"/>
-              <a:t>Create </a:t>
-            </a:r>
-            <a:r>
-              <a:rPr lang="en-US" sz="2400" dirty="0" smtClean="0"/>
-              <a:t>a new behavior. </a:t>
+              <a:t>Create a new behavior. </a:t>
             </a:r>
           </a:p>
           <a:p>
@@ -6492,13 +6652,8 @@
             </a:r>
             <a:r>
               <a:rPr lang="en-US" sz="2400" dirty="0" smtClean="0"/>
-              <a:t> * Alien will move three spaces </a:t>
-            </a:r>
-            <a:r>
-              <a:rPr lang="en-US" sz="2400" dirty="0" smtClean="0"/>
-              <a:t>in one direction (chosen randomly)</a:t>
-            </a:r>
-            <a:endParaRPr lang="en-US" sz="2400" dirty="0" smtClean="0"/>
+              <a:t> * Alien will move three spaces in one direction (chosen randomly)</a:t>
+            </a:r>
           </a:p>
           <a:p>
             <a:r>
@@ -6517,40 +6672,16 @@
             </a:r>
             <a:r>
               <a:rPr lang="en-US" sz="2400" dirty="0" smtClean="0"/>
-              <a:t> * Alien will fire a </a:t>
-            </a:r>
+              <a:t> * Alien will fire a rocket in that direction</a:t>
+            </a:r>
+          </a:p>
+          <a:p>
+            <a:endParaRPr lang="en-US" sz="2400" dirty="0"/>
+          </a:p>
+          <a:p>
             <a:r>
               <a:rPr lang="en-US" sz="2400" dirty="0" smtClean="0"/>
-              <a:t>rocket</a:t>
-            </a:r>
-            <a:r>
-              <a:rPr lang="en-US" sz="2400" dirty="0" smtClean="0"/>
-              <a:t> </a:t>
-            </a:r>
-            <a:r>
-              <a:rPr lang="en-US" sz="2400" dirty="0" smtClean="0"/>
-              <a:t>in that direction</a:t>
-            </a:r>
-          </a:p>
-          <a:p>
-            <a:endParaRPr lang="en-US" sz="2400" dirty="0"/>
-          </a:p>
-          <a:p>
-            <a:r>
-              <a:rPr lang="en-US" sz="2400" dirty="0" smtClean="0"/>
-              <a:t>Inject this behavior into any Alien that is </a:t>
-            </a:r>
-            <a:r>
-              <a:rPr lang="en-US" sz="2400" dirty="0" smtClean="0"/>
-              <a:t>added </a:t>
-            </a:r>
-            <a:r>
-              <a:rPr lang="en-US" sz="2400" dirty="0" smtClean="0"/>
-              <a:t>using the ‘Shooter’ </a:t>
-            </a:r>
-            <a:r>
-              <a:rPr lang="en-US" sz="2400" dirty="0" smtClean="0"/>
-              <a:t>option. Use Tracker and </a:t>
+              <a:t>Inject this behavior into any Alien that is added using the ‘Shooter’ option. Use Tracker and </a:t>
             </a:r>
             <a:r>
               <a:rPr lang="en-US" sz="2400" dirty="0" err="1" smtClean="0"/>
@@ -6560,7 +6691,6 @@
               <a:rPr lang="en-US" sz="2400" dirty="0" smtClean="0"/>
               <a:t> as a roadmap</a:t>
             </a:r>
-            <a:endParaRPr lang="en-US" sz="2400" dirty="0" smtClean="0"/>
           </a:p>
         </p:txBody>
       </p:sp>
@@ -6922,11 +7052,7 @@
             <a:pPr algn="ctr"/>
             <a:r>
               <a:rPr lang="en-US" dirty="0" smtClean="0"/>
-              <a:t>Computer</a:t>
-            </a:r>
-            <a:r>
-              <a:rPr lang="en-US" dirty="0" smtClean="0"/>
-              <a:t> </a:t>
+              <a:t>Computer </a:t>
             </a:r>
             <a:endParaRPr lang="en-US" dirty="0"/>
           </a:p>
@@ -7994,72 +8120,46 @@
           </a:prstGeom>
         </p:spPr>
       </p:pic>
-      <p:cxnSp>
-        <p:nvCxnSpPr>
-          <p:cNvPr id="6" name="Straight Arrow Connector 5"/>
-          <p:cNvCxnSpPr/>
+      <p:sp>
+        <p:nvSpPr>
+          <p:cNvPr id="7" name="Oval 6"/>
+          <p:cNvSpPr/>
           <p:nvPr/>
-        </p:nvCxnSpPr>
+        </p:nvSpPr>
         <p:spPr>
-          <a:xfrm flipH="1">
-            <a:off x="3218688" y="950976"/>
-            <a:ext cx="536448" cy="1865376"/>
+          <a:xfrm>
+            <a:off x="2620172" y="2720201"/>
+            <a:ext cx="1097280" cy="463296"/>
           </a:xfrm>
-          <a:prstGeom prst="straightConnector1">
+          <a:prstGeom prst="ellipse">
             <a:avLst/>
           </a:prstGeom>
-          <a:ln>
-            <a:tailEnd type="triangle"/>
-          </a:ln>
+          <a:noFill/>
+          <a:ln w="76200"/>
         </p:spPr>
         <p:style>
-          <a:lnRef idx="1">
-            <a:schemeClr val="accent1"/>
+          <a:lnRef idx="2">
+            <a:schemeClr val="accent4"/>
           </a:lnRef>
-          <a:fillRef idx="0">
-            <a:schemeClr val="accent1"/>
+          <a:fillRef idx="1">
+            <a:schemeClr val="lt1"/>
           </a:fillRef>
           <a:effectRef idx="0">
-            <a:schemeClr val="accent1"/>
+            <a:schemeClr val="accent4"/>
           </a:effectRef>
           <a:fontRef idx="minor">
-            <a:schemeClr val="tx1"/>
+            <a:schemeClr val="dk1"/>
           </a:fontRef>
         </p:style>
-      </p:cxnSp>
-      <p:cxnSp>
-        <p:nvCxnSpPr>
-          <p:cNvPr id="8" name="Straight Arrow Connector 7"/>
-          <p:cNvCxnSpPr/>
-          <p:nvPr/>
-        </p:nvCxnSpPr>
-        <p:spPr>
-          <a:xfrm flipH="1">
-            <a:off x="2023872" y="950976"/>
-            <a:ext cx="1194816" cy="841248"/>
-          </a:xfrm>
-          <a:prstGeom prst="straightConnector1">
-            <a:avLst/>
-          </a:prstGeom>
-          <a:ln>
-            <a:tailEnd type="triangle"/>
-          </a:ln>
-        </p:spPr>
-        <p:style>
-          <a:lnRef idx="1">
-            <a:schemeClr val="accent1"/>
-          </a:lnRef>
-          <a:fillRef idx="0">
-            <a:schemeClr val="accent1"/>
-          </a:fillRef>
-          <a:effectRef idx="0">
-            <a:schemeClr val="accent1"/>
-          </a:effectRef>
-          <a:fontRef idx="minor">
-            <a:schemeClr val="tx1"/>
-          </a:fontRef>
-        </p:style>
-      </p:cxnSp>
+        <p:txBody>
+          <a:bodyPr rtlCol="0" anchor="ctr"/>
+          <a:lstStyle/>
+          <a:p>
+            <a:pPr algn="ctr"/>
+            <a:endParaRPr lang="en-US" dirty="0"/>
+          </a:p>
+        </p:txBody>
+      </p:sp>
     </p:spTree>
     <p:extLst>
       <p:ext uri="{BB962C8B-B14F-4D97-AF65-F5344CB8AC3E}">

</xml_diff>